<commit_message>
Updtaed output to be cleaner
</commit_message>
<xml_diff>
--- a/ppt_analysis.pptx
+++ b/ppt_analysis.pptx
@@ -5,15 +5,15 @@
     <p:sldMasterId id="2147483660" r:id="rId1"/>
   </p:sldMasterIdLst>
   <p:sldIdLst>
-    <p:sldId id="256" r:id="rId6"/>
-    <p:sldId id="257" r:id="rId7"/>
-    <p:sldId id="258" r:id="rId8"/>
-    <p:sldId id="259" r:id="rId9"/>
-    <p:sldId id="260" r:id="rId10"/>
-    <p:sldId id="261" r:id="rId11"/>
-    <p:sldId id="262" r:id="rId12"/>
-    <p:sldId id="263" r:id="rId13"/>
-    <p:sldId id="264" r:id="rId14"/>
+    <p:sldId id="256" r:id="rId2"/>
+    <p:sldId id="257" r:id="rId3"/>
+    <p:sldId id="258" r:id="rId4"/>
+    <p:sldId id="259" r:id="rId5"/>
+    <p:sldId id="260" r:id="rId6"/>
+    <p:sldId id="261" r:id="rId7"/>
+    <p:sldId id="262" r:id="rId8"/>
+    <p:sldId id="263" r:id="rId9"/>
+    <p:sldId id="264" r:id="rId10"/>
   </p:sldIdLst>
   <p:sldSz cx="6858000" cy="9144000" type="letter"/>
   <p:notesSz cx="6858000" cy="9144000"/>
@@ -329,7 +329,7 @@
             <a:fld id="{0DAB70E3-47D6-2842-9376-028C836601F0}" type="datetimeFigureOut">
               <a:rPr lang="en-US" smtClean="0"/>
               <a:pPr/>
-              <a:t>8/26/19</a:t>
+              <a:t>8/28/19</a:t>
             </a:fld>
             <a:endParaRPr lang="en-US" dirty="0"/>
           </a:p>
@@ -486,7 +486,7 @@
           <a:p>
             <a:fld id="{0DAB70E3-47D6-2842-9376-028C836601F0}" type="datetimeFigureOut">
               <a:rPr lang="en-US" smtClean="0"/>
-              <a:t>8/26/19</a:t>
+              <a:t>8/28/19</a:t>
             </a:fld>
             <a:endParaRPr lang="en-US"/>
           </a:p>
@@ -576,8 +576,8 @@
         </p:nvSpPr>
         <p:spPr>
           <a:xfrm>
-            <a:off x="219547" y="4946262"/>
-            <a:ext cx="6391748" cy="3588118"/>
+            <a:off x="219547" y="4311074"/>
+            <a:ext cx="6391748" cy="2064922"/>
           </a:xfrm>
           <a:ln>
             <a:solidFill>
@@ -593,57 +593,61 @@
           </a:bodyPr>
           <a:lstStyle>
             <a:lvl1pPr marL="0" indent="0">
-              <a:buNone/>
-              <a:defRPr sz="1050"/>
+              <a:buFont typeface="Arial" panose="020B0604020202020204" pitchFamily="34" charset="0"/>
+              <a:buNone/>
+              <a:defRPr sz="1100"/>
             </a:lvl1pPr>
-            <a:lvl2pPr>
-              <a:defRPr sz="1050"/>
+            <a:lvl2pPr marL="342900" indent="0">
+              <a:buNone/>
+              <a:defRPr sz="1100"/>
             </a:lvl2pPr>
-            <a:lvl3pPr>
-              <a:defRPr sz="1050"/>
+            <a:lvl3pPr marL="685800" indent="0">
+              <a:buNone/>
+              <a:defRPr sz="1100"/>
             </a:lvl3pPr>
-            <a:lvl4pPr>
-              <a:defRPr sz="1050"/>
+            <a:lvl4pPr marL="1028700" indent="0">
+              <a:buNone/>
+              <a:defRPr sz="1100"/>
             </a:lvl4pPr>
-            <a:lvl5pPr>
-              <a:defRPr sz="1050"/>
+            <a:lvl5pPr marL="1371600" indent="0">
+              <a:buNone/>
+              <a:defRPr sz="1100"/>
             </a:lvl5pPr>
           </a:lstStyle>
           <a:p>
             <a:pPr lvl="0"/>
             <a:r>
-              <a:rPr lang="en-US"/>
+              <a:rPr lang="en-US" dirty="0"/>
               <a:t>Click to edit Master text styles</a:t>
             </a:r>
           </a:p>
           <a:p>
             <a:pPr lvl="1"/>
             <a:r>
-              <a:rPr lang="en-US"/>
+              <a:rPr lang="en-US" dirty="0"/>
               <a:t>Second level</a:t>
             </a:r>
           </a:p>
           <a:p>
             <a:pPr lvl="2"/>
             <a:r>
-              <a:rPr lang="en-US"/>
+              <a:rPr lang="en-US" dirty="0"/>
               <a:t>Third level</a:t>
             </a:r>
           </a:p>
           <a:p>
             <a:pPr lvl="3"/>
             <a:r>
-              <a:rPr lang="en-US"/>
+              <a:rPr lang="en-US" dirty="0"/>
               <a:t>Fourth level</a:t>
             </a:r>
           </a:p>
           <a:p>
             <a:pPr lvl="4"/>
             <a:r>
-              <a:rPr lang="en-US"/>
+              <a:rPr lang="en-US" dirty="0"/>
               <a:t>Fifth level</a:t>
             </a:r>
-            <a:endParaRPr lang="en-US" dirty="0"/>
           </a:p>
         </p:txBody>
       </p:sp>
@@ -664,7 +668,7 @@
           <a:p>
             <a:fld id="{0DAB70E3-47D6-2842-9376-028C836601F0}" type="datetimeFigureOut">
               <a:rPr lang="en-US" smtClean="0"/>
-              <a:t>8/26/19</a:t>
+              <a:t>8/28/19</a:t>
             </a:fld>
             <a:endParaRPr lang="en-US"/>
           </a:p>
@@ -680,7 +684,12 @@
             <p:ph type="ftr" sz="quarter" idx="11"/>
           </p:nvPr>
         </p:nvSpPr>
-        <p:spPr/>
+        <p:spPr>
+          <a:xfrm>
+            <a:off x="1543050" y="8947282"/>
+            <a:ext cx="3771900" cy="196718"/>
+          </a:xfrm>
+        </p:spPr>
         <p:txBody>
           <a:bodyPr/>
           <a:lstStyle/>
@@ -726,7 +735,7 @@
         </p:nvSpPr>
         <p:spPr>
           <a:xfrm>
-            <a:off x="219547" y="1307335"/>
+            <a:off x="219547" y="1068799"/>
             <a:ext cx="3112129" cy="369332"/>
           </a:xfrm>
           <a:prstGeom prst="rect">
@@ -765,7 +774,7 @@
         </p:nvSpPr>
         <p:spPr>
           <a:xfrm>
-            <a:off x="236796" y="1787943"/>
+            <a:off x="236796" y="1549407"/>
             <a:ext cx="1828800" cy="548640"/>
           </a:xfrm>
           <a:ln>
@@ -809,7 +818,7 @@
         </p:nvSpPr>
         <p:spPr>
           <a:xfrm>
-            <a:off x="236796" y="2349836"/>
+            <a:off x="236796" y="2111300"/>
             <a:ext cx="1828800" cy="182880"/>
           </a:xfrm>
           <a:prstGeom prst="rect">
@@ -849,7 +858,7 @@
         </p:nvSpPr>
         <p:spPr>
           <a:xfrm>
-            <a:off x="2514703" y="1792009"/>
+            <a:off x="2514703" y="1553473"/>
             <a:ext cx="1828800" cy="548640"/>
           </a:xfrm>
           <a:ln>
@@ -897,7 +906,7 @@
         </p:nvSpPr>
         <p:spPr>
           <a:xfrm>
-            <a:off x="4772392" y="1798249"/>
+            <a:off x="4772392" y="1559713"/>
             <a:ext cx="1828800" cy="548640"/>
           </a:xfrm>
           <a:ln>
@@ -941,7 +950,7 @@
         </p:nvSpPr>
         <p:spPr>
           <a:xfrm>
-            <a:off x="2514703" y="2364512"/>
+            <a:off x="2514703" y="2125976"/>
             <a:ext cx="1828800" cy="182880"/>
           </a:xfrm>
           <a:prstGeom prst="rect">
@@ -977,7 +986,7 @@
         </p:nvSpPr>
         <p:spPr>
           <a:xfrm>
-            <a:off x="4772392" y="2363088"/>
+            <a:off x="4772392" y="2124552"/>
             <a:ext cx="1828800" cy="182880"/>
           </a:xfrm>
           <a:prstGeom prst="rect">
@@ -1013,8 +1022,8 @@
         </p:nvSpPr>
         <p:spPr>
           <a:xfrm>
-            <a:off x="3479404" y="2933164"/>
-            <a:ext cx="1098378" cy="215444"/>
+            <a:off x="3438535" y="2444954"/>
+            <a:ext cx="593111" cy="215444"/>
           </a:xfrm>
           <a:prstGeom prst="rect">
             <a:avLst/>
@@ -1029,7 +1038,7 @@
           <a:p>
             <a:r>
               <a:rPr lang="en-US" sz="1400" dirty="0"/>
-              <a:t>Project Owner:</a:t>
+              <a:t>Sponsor</a:t>
             </a:r>
           </a:p>
         </p:txBody>
@@ -1048,8 +1057,8 @@
         </p:nvSpPr>
         <p:spPr>
           <a:xfrm>
-            <a:off x="3476641" y="3304212"/>
-            <a:ext cx="1197764" cy="215444"/>
+            <a:off x="3435772" y="2816002"/>
+            <a:ext cx="1098378" cy="215444"/>
           </a:xfrm>
           <a:prstGeom prst="rect">
             <a:avLst/>
@@ -1064,7 +1073,7 @@
           <a:p>
             <a:r>
               <a:rPr lang="en-US" sz="1400" dirty="0"/>
-              <a:t>Project Sponsor:</a:t>
+              <a:t>Project Owner:</a:t>
             </a:r>
           </a:p>
         </p:txBody>
@@ -1083,7 +1092,7 @@
         </p:nvSpPr>
         <p:spPr>
           <a:xfrm>
-            <a:off x="3469869" y="3675260"/>
+            <a:off x="3429000" y="3187050"/>
             <a:ext cx="1262012" cy="215444"/>
           </a:xfrm>
           <a:prstGeom prst="rect">
@@ -1122,8 +1131,8 @@
         </p:nvSpPr>
         <p:spPr>
           <a:xfrm>
-            <a:off x="4772393" y="2901980"/>
-            <a:ext cx="1815263" cy="277812"/>
+            <a:off x="4691013" y="2421427"/>
+            <a:ext cx="1896644" cy="277812"/>
           </a:xfrm>
           <a:ln>
             <a:solidFill>
@@ -1170,8 +1179,8 @@
         </p:nvSpPr>
         <p:spPr>
           <a:xfrm>
-            <a:off x="4772393" y="3273028"/>
-            <a:ext cx="1815263" cy="277812"/>
+            <a:off x="4691013" y="2792475"/>
+            <a:ext cx="1896644" cy="277812"/>
           </a:xfrm>
           <a:ln>
             <a:solidFill>
@@ -1218,8 +1227,8 @@
         </p:nvSpPr>
         <p:spPr>
           <a:xfrm>
-            <a:off x="4772392" y="3640257"/>
-            <a:ext cx="1815263" cy="277812"/>
+            <a:off x="4691012" y="3159704"/>
+            <a:ext cx="1896644" cy="277812"/>
           </a:xfrm>
           <a:ln>
             <a:solidFill>
@@ -1262,7 +1271,7 @@
         </p:nvSpPr>
         <p:spPr>
           <a:xfrm>
-            <a:off x="3493949" y="4299536"/>
+            <a:off x="3493949" y="3677477"/>
             <a:ext cx="1189428" cy="184666"/>
           </a:xfrm>
           <a:prstGeom prst="rect">
@@ -1301,7 +1310,7 @@
         </p:nvSpPr>
         <p:spPr>
           <a:xfrm>
-            <a:off x="4801794" y="4266215"/>
+            <a:off x="4801794" y="3644156"/>
             <a:ext cx="1815263" cy="277812"/>
           </a:xfrm>
           <a:ln>
@@ -1345,7 +1354,7 @@
         </p:nvSpPr>
         <p:spPr>
           <a:xfrm>
-            <a:off x="237940" y="4320035"/>
+            <a:off x="237940" y="3697976"/>
             <a:ext cx="421462" cy="184666"/>
           </a:xfrm>
           <a:prstGeom prst="rect">
@@ -1384,7 +1393,7 @@
         </p:nvSpPr>
         <p:spPr>
           <a:xfrm>
-            <a:off x="1543030" y="4273462"/>
+            <a:off x="1543030" y="3651403"/>
             <a:ext cx="1815263" cy="277812"/>
           </a:xfrm>
           <a:ln>
@@ -1430,7 +1439,7 @@
         </p:nvCxnSpPr>
         <p:spPr>
           <a:xfrm>
-            <a:off x="220583" y="2716592"/>
+            <a:off x="220583" y="2325546"/>
             <a:ext cx="6367072" cy="0"/>
           </a:xfrm>
           <a:prstGeom prst="line">
@@ -1475,7 +1484,7 @@
         </p:nvCxnSpPr>
         <p:spPr>
           <a:xfrm>
-            <a:off x="219547" y="4092377"/>
+            <a:off x="219547" y="3548821"/>
             <a:ext cx="6397070" cy="0"/>
           </a:xfrm>
           <a:prstGeom prst="line">
@@ -1554,7 +1563,7 @@
         </p:nvCxnSpPr>
         <p:spPr>
           <a:xfrm>
-            <a:off x="219547" y="4729862"/>
+            <a:off x="225938" y="4018291"/>
             <a:ext cx="6406123" cy="0"/>
           </a:xfrm>
           <a:prstGeom prst="line">
@@ -1597,7 +1606,7 @@
         </p:nvSpPr>
         <p:spPr>
           <a:xfrm>
-            <a:off x="240703" y="2933164"/>
+            <a:off x="240703" y="2452611"/>
             <a:ext cx="939296" cy="215444"/>
           </a:xfrm>
           <a:prstGeom prst="rect">
@@ -1632,7 +1641,7 @@
         </p:nvSpPr>
         <p:spPr>
           <a:xfrm>
-            <a:off x="237940" y="3304212"/>
+            <a:off x="237940" y="2823659"/>
             <a:ext cx="499496" cy="215444"/>
           </a:xfrm>
           <a:prstGeom prst="rect">
@@ -1667,7 +1676,7 @@
         </p:nvSpPr>
         <p:spPr>
           <a:xfrm>
-            <a:off x="231168" y="3675260"/>
+            <a:off x="231168" y="3194707"/>
             <a:ext cx="930319" cy="215444"/>
           </a:xfrm>
           <a:prstGeom prst="rect">
@@ -1706,8 +1715,8 @@
         </p:nvSpPr>
         <p:spPr>
           <a:xfrm>
-            <a:off x="1533692" y="2901980"/>
-            <a:ext cx="1815263" cy="277812"/>
+            <a:off x="1270001" y="2421427"/>
+            <a:ext cx="2061676" cy="277812"/>
           </a:xfrm>
           <a:ln>
             <a:solidFill>
@@ -1754,8 +1763,8 @@
         </p:nvSpPr>
         <p:spPr>
           <a:xfrm>
-            <a:off x="1533692" y="3273028"/>
-            <a:ext cx="1815263" cy="277812"/>
+            <a:off x="1270001" y="2792475"/>
+            <a:ext cx="2061676" cy="277812"/>
           </a:xfrm>
           <a:ln>
             <a:solidFill>
@@ -1802,8 +1811,8 @@
         </p:nvSpPr>
         <p:spPr>
           <a:xfrm>
-            <a:off x="1533691" y="3640257"/>
-            <a:ext cx="1815263" cy="277812"/>
+            <a:off x="1270000" y="3159704"/>
+            <a:ext cx="2061676" cy="277812"/>
           </a:xfrm>
           <a:ln>
             <a:solidFill>
@@ -1850,7 +1859,7 @@
         </p:nvSpPr>
         <p:spPr>
           <a:xfrm>
-            <a:off x="3526326" y="1307335"/>
+            <a:off x="3526326" y="1068799"/>
             <a:ext cx="3084969" cy="370290"/>
           </a:xfrm>
           <a:ln>
@@ -1873,6 +1882,299 @@
               <a:rPr lang="en-US"/>
               <a:t>Click to edit Master text styles</a:t>
             </a:r>
+          </a:p>
+        </p:txBody>
+      </p:sp>
+      <p:sp>
+        <p:nvSpPr>
+          <p:cNvPr id="46" name="Content Placeholder 2">
+            <a:extLst>
+              <a:ext uri="{FF2B5EF4-FFF2-40B4-BE49-F238E27FC236}">
+                <a16:creationId xmlns:a16="http://schemas.microsoft.com/office/drawing/2014/main" id="{2138F707-89E5-E74E-85B8-6A402D79B4F6}"/>
+              </a:ext>
+            </a:extLst>
+          </p:cNvPr>
+          <p:cNvSpPr>
+            <a:spLocks noGrp="1"/>
+          </p:cNvSpPr>
+          <p:nvPr>
+            <p:ph idx="28"/>
+          </p:nvPr>
+        </p:nvSpPr>
+        <p:spPr>
+          <a:xfrm>
+            <a:off x="231168" y="6545926"/>
+            <a:ext cx="3108960" cy="2352858"/>
+          </a:xfrm>
+          <a:ln>
+            <a:solidFill>
+              <a:schemeClr val="bg2">
+                <a:lumMod val="90000"/>
+              </a:schemeClr>
+            </a:solidFill>
+          </a:ln>
+        </p:spPr>
+        <p:txBody>
+          <a:bodyPr>
+            <a:normAutofit/>
+          </a:bodyPr>
+          <a:lstStyle>
+            <a:lvl1pPr marL="0" indent="0">
+              <a:buNone/>
+              <a:defRPr sz="1000"/>
+            </a:lvl1pPr>
+            <a:lvl2pPr marL="342900" indent="0">
+              <a:buNone/>
+              <a:defRPr sz="1000"/>
+            </a:lvl2pPr>
+            <a:lvl3pPr marL="685800" indent="0">
+              <a:buNone/>
+              <a:defRPr sz="1000"/>
+            </a:lvl3pPr>
+            <a:lvl4pPr marL="1028700" indent="0">
+              <a:buNone/>
+              <a:defRPr sz="1000"/>
+            </a:lvl4pPr>
+            <a:lvl5pPr marL="1371600" indent="0">
+              <a:buNone/>
+              <a:defRPr sz="1000"/>
+            </a:lvl5pPr>
+          </a:lstStyle>
+          <a:p>
+            <a:pPr lvl="0"/>
+            <a:r>
+              <a:rPr lang="en-US" dirty="0"/>
+              <a:t>Click to edit Master text styles</a:t>
+            </a:r>
+          </a:p>
+          <a:p>
+            <a:pPr lvl="1"/>
+            <a:r>
+              <a:rPr lang="en-US" dirty="0"/>
+              <a:t>Second level</a:t>
+            </a:r>
+          </a:p>
+          <a:p>
+            <a:pPr lvl="2"/>
+            <a:r>
+              <a:rPr lang="en-US" dirty="0"/>
+              <a:t>Third level</a:t>
+            </a:r>
+          </a:p>
+          <a:p>
+            <a:pPr lvl="3"/>
+            <a:r>
+              <a:rPr lang="en-US" dirty="0"/>
+              <a:t>Fourth level</a:t>
+            </a:r>
+          </a:p>
+          <a:p>
+            <a:pPr lvl="4"/>
+            <a:r>
+              <a:rPr lang="en-US" dirty="0"/>
+              <a:t>Fifth level</a:t>
+            </a:r>
+          </a:p>
+        </p:txBody>
+      </p:sp>
+      <p:sp>
+        <p:nvSpPr>
+          <p:cNvPr id="48" name="Content Placeholder 2">
+            <a:extLst>
+              <a:ext uri="{FF2B5EF4-FFF2-40B4-BE49-F238E27FC236}">
+                <a16:creationId xmlns:a16="http://schemas.microsoft.com/office/drawing/2014/main" id="{24E350A5-74D4-844C-B3B9-C373081BD9A4}"/>
+              </a:ext>
+            </a:extLst>
+          </p:cNvPr>
+          <p:cNvSpPr>
+            <a:spLocks noGrp="1"/>
+          </p:cNvSpPr>
+          <p:nvPr>
+            <p:ph idx="13"/>
+          </p:nvPr>
+        </p:nvSpPr>
+        <p:spPr>
+          <a:xfrm>
+            <a:off x="3568728" y="6538501"/>
+            <a:ext cx="3108960" cy="2352859"/>
+          </a:xfrm>
+          <a:ln>
+            <a:solidFill>
+              <a:schemeClr val="bg2">
+                <a:lumMod val="90000"/>
+              </a:schemeClr>
+            </a:solidFill>
+          </a:ln>
+        </p:spPr>
+        <p:txBody>
+          <a:bodyPr>
+            <a:normAutofit/>
+          </a:bodyPr>
+          <a:lstStyle>
+            <a:lvl1pPr marL="0" indent="0">
+              <a:buNone/>
+              <a:defRPr sz="1000"/>
+            </a:lvl1pPr>
+            <a:lvl2pPr marL="342900" indent="0">
+              <a:buNone/>
+              <a:defRPr sz="1000"/>
+            </a:lvl2pPr>
+            <a:lvl3pPr marL="685800" indent="0">
+              <a:buNone/>
+              <a:defRPr sz="1000"/>
+            </a:lvl3pPr>
+            <a:lvl4pPr marL="1028700" indent="0">
+              <a:buNone/>
+              <a:defRPr sz="1000"/>
+            </a:lvl4pPr>
+            <a:lvl5pPr marL="1371600" indent="0">
+              <a:buNone/>
+              <a:defRPr sz="1000"/>
+            </a:lvl5pPr>
+          </a:lstStyle>
+          <a:p>
+            <a:pPr lvl="0"/>
+            <a:r>
+              <a:rPr lang="en-US"/>
+              <a:t>Click to edit Master text styles</a:t>
+            </a:r>
+          </a:p>
+          <a:p>
+            <a:pPr lvl="1"/>
+            <a:r>
+              <a:rPr lang="en-US"/>
+              <a:t>Second level</a:t>
+            </a:r>
+          </a:p>
+          <a:p>
+            <a:pPr lvl="2"/>
+            <a:r>
+              <a:rPr lang="en-US"/>
+              <a:t>Third level</a:t>
+            </a:r>
+          </a:p>
+          <a:p>
+            <a:pPr lvl="3"/>
+            <a:r>
+              <a:rPr lang="en-US"/>
+              <a:t>Fourth level</a:t>
+            </a:r>
+          </a:p>
+          <a:p>
+            <a:pPr lvl="4"/>
+            <a:r>
+              <a:rPr lang="en-US"/>
+              <a:t>Fifth level</a:t>
+            </a:r>
+            <a:endParaRPr lang="en-US" dirty="0"/>
+          </a:p>
+        </p:txBody>
+      </p:sp>
+      <p:sp>
+        <p:nvSpPr>
+          <p:cNvPr id="49" name="TextBox 48">
+            <a:extLst>
+              <a:ext uri="{FF2B5EF4-FFF2-40B4-BE49-F238E27FC236}">
+                <a16:creationId xmlns:a16="http://schemas.microsoft.com/office/drawing/2014/main" id="{D9C8F2B8-59A7-3C4A-9B05-737BD487C329}"/>
+              </a:ext>
+            </a:extLst>
+          </p:cNvPr>
+          <p:cNvSpPr txBox="1"/>
+          <p:nvPr userDrawn="1"/>
+        </p:nvSpPr>
+        <p:spPr>
+          <a:xfrm>
+            <a:off x="3568728" y="6375296"/>
+            <a:ext cx="3108960" cy="160932"/>
+          </a:xfrm>
+          <a:prstGeom prst="rect">
+            <a:avLst/>
+          </a:prstGeom>
+          <a:noFill/>
+        </p:spPr>
+        <p:txBody>
+          <a:bodyPr wrap="none" lIns="0" tIns="0" rIns="0" bIns="0" rtlCol="0">
+            <a:noAutofit/>
+          </a:bodyPr>
+          <a:lstStyle/>
+          <a:p>
+            <a:r>
+              <a:rPr lang="en-US" sz="1200" dirty="0"/>
+              <a:t>Investment</a:t>
+            </a:r>
+            <a:endParaRPr lang="en-US" sz="1000" dirty="0"/>
+          </a:p>
+        </p:txBody>
+      </p:sp>
+      <p:sp>
+        <p:nvSpPr>
+          <p:cNvPr id="50" name="TextBox 49">
+            <a:extLst>
+              <a:ext uri="{FF2B5EF4-FFF2-40B4-BE49-F238E27FC236}">
+                <a16:creationId xmlns:a16="http://schemas.microsoft.com/office/drawing/2014/main" id="{A34457A8-DE0D-FE45-88BD-CF8A739778EB}"/>
+              </a:ext>
+            </a:extLst>
+          </p:cNvPr>
+          <p:cNvSpPr txBox="1"/>
+          <p:nvPr userDrawn="1"/>
+        </p:nvSpPr>
+        <p:spPr>
+          <a:xfrm>
+            <a:off x="219547" y="6375296"/>
+            <a:ext cx="3108960" cy="160932"/>
+          </a:xfrm>
+          <a:prstGeom prst="rect">
+            <a:avLst/>
+          </a:prstGeom>
+          <a:noFill/>
+        </p:spPr>
+        <p:txBody>
+          <a:bodyPr wrap="none" lIns="0" tIns="0" rIns="0" bIns="0" rtlCol="0">
+            <a:noAutofit/>
+          </a:bodyPr>
+          <a:lstStyle/>
+          <a:p>
+            <a:r>
+              <a:rPr lang="en-US" sz="1200" dirty="0"/>
+              <a:t>Return</a:t>
+            </a:r>
+            <a:endParaRPr lang="en-US" sz="1000" dirty="0"/>
+          </a:p>
+        </p:txBody>
+      </p:sp>
+      <p:sp>
+        <p:nvSpPr>
+          <p:cNvPr id="51" name="TextBox 50">
+            <a:extLst>
+              <a:ext uri="{FF2B5EF4-FFF2-40B4-BE49-F238E27FC236}">
+                <a16:creationId xmlns:a16="http://schemas.microsoft.com/office/drawing/2014/main" id="{9858558E-AB96-B945-90D5-03AE9DB022D4}"/>
+              </a:ext>
+            </a:extLst>
+          </p:cNvPr>
+          <p:cNvSpPr txBox="1"/>
+          <p:nvPr userDrawn="1"/>
+        </p:nvSpPr>
+        <p:spPr>
+          <a:xfrm>
+            <a:off x="215477" y="4074214"/>
+            <a:ext cx="3108960" cy="229668"/>
+          </a:xfrm>
+          <a:prstGeom prst="rect">
+            <a:avLst/>
+          </a:prstGeom>
+          <a:noFill/>
+        </p:spPr>
+        <p:txBody>
+          <a:bodyPr wrap="none" lIns="0" tIns="0" rIns="0" bIns="0" rtlCol="0">
+            <a:noAutofit/>
+          </a:bodyPr>
+          <a:lstStyle/>
+          <a:p>
+            <a:r>
+              <a:rPr lang="en-US" sz="1600" dirty="0"/>
+              <a:t>Project Description</a:t>
+            </a:r>
+            <a:endParaRPr lang="en-US" sz="1100" dirty="0"/>
           </a:p>
         </p:txBody>
       </p:sp>
@@ -1908,18 +2210,127 @@
       </p:grpSpPr>
       <p:sp>
         <p:nvSpPr>
-          <p:cNvPr id="3" name="Content Placeholder 2"/>
-          <p:cNvSpPr>
-            <a:spLocks noGrp="1"/>
-          </p:cNvSpPr>
-          <p:nvPr>
-            <p:ph idx="1"/>
-          </p:nvPr>
-        </p:nvSpPr>
-        <p:spPr>
-          <a:xfrm>
-            <a:off x="228600" y="1716597"/>
-            <a:ext cx="3108960" cy="2011680"/>
+          <p:cNvPr id="4" name="Date Placeholder 3"/>
+          <p:cNvSpPr>
+            <a:spLocks noGrp="1"/>
+          </p:cNvSpPr>
+          <p:nvPr>
+            <p:ph type="dt" sz="half" idx="10"/>
+          </p:nvPr>
+        </p:nvSpPr>
+        <p:spPr/>
+        <p:txBody>
+          <a:bodyPr/>
+          <a:lstStyle/>
+          <a:p>
+            <a:fld id="{0DAB70E3-47D6-2842-9376-028C836601F0}" type="datetimeFigureOut">
+              <a:rPr lang="en-US" smtClean="0"/>
+              <a:t>8/28/19</a:t>
+            </a:fld>
+            <a:endParaRPr lang="en-US"/>
+          </a:p>
+        </p:txBody>
+      </p:sp>
+      <p:sp>
+        <p:nvSpPr>
+          <p:cNvPr id="5" name="Footer Placeholder 4"/>
+          <p:cNvSpPr>
+            <a:spLocks noGrp="1"/>
+          </p:cNvSpPr>
+          <p:nvPr>
+            <p:ph type="ftr" sz="quarter" idx="11"/>
+          </p:nvPr>
+        </p:nvSpPr>
+        <p:spPr>
+          <a:xfrm>
+            <a:off x="1543050" y="8931636"/>
+            <a:ext cx="3771900" cy="212364"/>
+          </a:xfrm>
+        </p:spPr>
+        <p:txBody>
+          <a:bodyPr/>
+          <a:lstStyle/>
+          <a:p>
+            <a:endParaRPr lang="en-US"/>
+          </a:p>
+        </p:txBody>
+      </p:sp>
+      <p:sp>
+        <p:nvSpPr>
+          <p:cNvPr id="6" name="Slide Number Placeholder 5"/>
+          <p:cNvSpPr>
+            <a:spLocks noGrp="1"/>
+          </p:cNvSpPr>
+          <p:nvPr>
+            <p:ph type="sldNum" sz="quarter" idx="12"/>
+          </p:nvPr>
+        </p:nvSpPr>
+        <p:spPr/>
+        <p:txBody>
+          <a:bodyPr/>
+          <a:lstStyle/>
+          <a:p>
+            <a:fld id="{EBDA84D8-2017-D642-A480-A65A29EB22F2}" type="slidenum">
+              <a:rPr lang="en-US" smtClean="0"/>
+              <a:t>‹#›</a:t>
+            </a:fld>
+            <a:endParaRPr lang="en-US"/>
+          </a:p>
+        </p:txBody>
+      </p:sp>
+      <p:sp>
+        <p:nvSpPr>
+          <p:cNvPr id="59" name="Title 58">
+            <a:extLst>
+              <a:ext uri="{FF2B5EF4-FFF2-40B4-BE49-F238E27FC236}">
+                <a16:creationId xmlns:a16="http://schemas.microsoft.com/office/drawing/2014/main" id="{C2DFE595-E7EE-2246-BF46-4D09947A0699}"/>
+              </a:ext>
+            </a:extLst>
+          </p:cNvPr>
+          <p:cNvSpPr>
+            <a:spLocks noGrp="1"/>
+          </p:cNvSpPr>
+          <p:nvPr>
+            <p:ph type="title"/>
+          </p:nvPr>
+        </p:nvSpPr>
+        <p:spPr>
+          <a:xfrm>
+            <a:off x="882177" y="244538"/>
+            <a:ext cx="5715000" cy="457200"/>
+          </a:xfrm>
+        </p:spPr>
+        <p:txBody>
+          <a:bodyPr/>
+          <a:lstStyle/>
+          <a:p>
+            <a:r>
+              <a:rPr lang="en-US"/>
+              <a:t>Click to edit Master title style</a:t>
+            </a:r>
+          </a:p>
+        </p:txBody>
+      </p:sp>
+      <p:sp>
+        <p:nvSpPr>
+          <p:cNvPr id="43" name="Content Placeholder 2">
+            <a:extLst>
+              <a:ext uri="{FF2B5EF4-FFF2-40B4-BE49-F238E27FC236}">
+                <a16:creationId xmlns:a16="http://schemas.microsoft.com/office/drawing/2014/main" id="{287D95BD-5A4D-8748-87D0-27B9C457688A}"/>
+              </a:ext>
+            </a:extLst>
+          </p:cNvPr>
+          <p:cNvSpPr>
+            <a:spLocks noGrp="1"/>
+          </p:cNvSpPr>
+          <p:nvPr>
+            <p:ph idx="14"/>
+          </p:nvPr>
+        </p:nvSpPr>
+        <p:spPr>
+          <a:xfrm>
+            <a:off x="228600" y="1243702"/>
+            <a:ext cx="3108960" cy="3200400"/>
           </a:xfrm>
           <a:ln>
             <a:solidFill>
@@ -1934,366 +2345,25 @@
             <a:normAutofit/>
           </a:bodyPr>
           <a:lstStyle>
-            <a:lvl1pPr>
-              <a:defRPr sz="1050"/>
+            <a:lvl1pPr marL="0" indent="0">
+              <a:buNone/>
+              <a:defRPr sz="1000"/>
             </a:lvl1pPr>
-            <a:lvl2pPr>
-              <a:defRPr sz="1050"/>
+            <a:lvl2pPr marL="342900" indent="0">
+              <a:buNone/>
+              <a:defRPr sz="1000"/>
             </a:lvl2pPr>
-            <a:lvl3pPr>
-              <a:defRPr sz="1050"/>
+            <a:lvl3pPr marL="685800" indent="0">
+              <a:buNone/>
+              <a:defRPr sz="1000"/>
             </a:lvl3pPr>
-            <a:lvl4pPr>
-              <a:defRPr sz="1050"/>
+            <a:lvl4pPr marL="1028700" indent="0">
+              <a:buNone/>
+              <a:defRPr sz="1000"/>
             </a:lvl4pPr>
-            <a:lvl5pPr>
-              <a:defRPr sz="1050"/>
-            </a:lvl5pPr>
-          </a:lstStyle>
-          <a:p>
-            <a:pPr lvl="0"/>
-            <a:r>
-              <a:rPr lang="en-US"/>
-              <a:t>Click to edit Master text styles</a:t>
-            </a:r>
-          </a:p>
-          <a:p>
-            <a:pPr lvl="1"/>
-            <a:r>
-              <a:rPr lang="en-US"/>
-              <a:t>Second level</a:t>
-            </a:r>
-          </a:p>
-          <a:p>
-            <a:pPr lvl="2"/>
-            <a:r>
-              <a:rPr lang="en-US"/>
-              <a:t>Third level</a:t>
-            </a:r>
-          </a:p>
-          <a:p>
-            <a:pPr lvl="3"/>
-            <a:r>
-              <a:rPr lang="en-US"/>
-              <a:t>Fourth level</a:t>
-            </a:r>
-          </a:p>
-          <a:p>
-            <a:pPr lvl="4"/>
-            <a:r>
-              <a:rPr lang="en-US"/>
-              <a:t>Fifth level</a:t>
-            </a:r>
-            <a:endParaRPr lang="en-US" dirty="0"/>
-          </a:p>
-        </p:txBody>
-      </p:sp>
-      <p:sp>
-        <p:nvSpPr>
-          <p:cNvPr id="4" name="Date Placeholder 3"/>
-          <p:cNvSpPr>
-            <a:spLocks noGrp="1"/>
-          </p:cNvSpPr>
-          <p:nvPr>
-            <p:ph type="dt" sz="half" idx="10"/>
-          </p:nvPr>
-        </p:nvSpPr>
-        <p:spPr/>
-        <p:txBody>
-          <a:bodyPr/>
-          <a:lstStyle/>
-          <a:p>
-            <a:fld id="{0DAB70E3-47D6-2842-9376-028C836601F0}" type="datetimeFigureOut">
-              <a:rPr lang="en-US" smtClean="0"/>
-              <a:t>8/26/19</a:t>
-            </a:fld>
-            <a:endParaRPr lang="en-US"/>
-          </a:p>
-        </p:txBody>
-      </p:sp>
-      <p:sp>
-        <p:nvSpPr>
-          <p:cNvPr id="5" name="Footer Placeholder 4"/>
-          <p:cNvSpPr>
-            <a:spLocks noGrp="1"/>
-          </p:cNvSpPr>
-          <p:nvPr>
-            <p:ph type="ftr" sz="quarter" idx="11"/>
-          </p:nvPr>
-        </p:nvSpPr>
-        <p:spPr/>
-        <p:txBody>
-          <a:bodyPr/>
-          <a:lstStyle/>
-          <a:p>
-            <a:endParaRPr lang="en-US"/>
-          </a:p>
-        </p:txBody>
-      </p:sp>
-      <p:sp>
-        <p:nvSpPr>
-          <p:cNvPr id="6" name="Slide Number Placeholder 5"/>
-          <p:cNvSpPr>
-            <a:spLocks noGrp="1"/>
-          </p:cNvSpPr>
-          <p:nvPr>
-            <p:ph type="sldNum" sz="quarter" idx="12"/>
-          </p:nvPr>
-        </p:nvSpPr>
-        <p:spPr/>
-        <p:txBody>
-          <a:bodyPr/>
-          <a:lstStyle/>
-          <a:p>
-            <a:fld id="{EBDA84D8-2017-D642-A480-A65A29EB22F2}" type="slidenum">
-              <a:rPr lang="en-US" smtClean="0"/>
-              <a:t>‹#›</a:t>
-            </a:fld>
-            <a:endParaRPr lang="en-US"/>
-          </a:p>
-        </p:txBody>
-      </p:sp>
-      <p:sp>
-        <p:nvSpPr>
-          <p:cNvPr id="33" name="TextBox 32">
-            <a:extLst>
-              <a:ext uri="{FF2B5EF4-FFF2-40B4-BE49-F238E27FC236}">
-                <a16:creationId xmlns:a16="http://schemas.microsoft.com/office/drawing/2014/main" id="{54515B47-A7C3-BB49-B87C-B01BB10685A5}"/>
-              </a:ext>
-            </a:extLst>
-          </p:cNvPr>
-          <p:cNvSpPr txBox="1"/>
-          <p:nvPr userDrawn="1"/>
-        </p:nvSpPr>
-        <p:spPr>
-          <a:xfrm>
-            <a:off x="228600" y="1439597"/>
-            <a:ext cx="1761829" cy="276999"/>
-          </a:xfrm>
-          <a:prstGeom prst="rect">
-            <a:avLst/>
-          </a:prstGeom>
-          <a:noFill/>
-        </p:spPr>
-        <p:txBody>
-          <a:bodyPr wrap="none" lIns="0" tIns="0" rIns="0" bIns="0" rtlCol="0">
-            <a:spAutoFit/>
-          </a:bodyPr>
-          <a:lstStyle/>
-          <a:p>
-            <a:r>
-              <a:rPr lang="en-US" sz="1800" dirty="0"/>
-              <a:t>Return Description</a:t>
-            </a:r>
-            <a:endParaRPr lang="en-US" sz="1200" dirty="0"/>
-          </a:p>
-        </p:txBody>
-      </p:sp>
-      <p:sp>
-        <p:nvSpPr>
-          <p:cNvPr id="59" name="Title 58">
-            <a:extLst>
-              <a:ext uri="{FF2B5EF4-FFF2-40B4-BE49-F238E27FC236}">
-                <a16:creationId xmlns:a16="http://schemas.microsoft.com/office/drawing/2014/main" id="{C2DFE595-E7EE-2246-BF46-4D09947A0699}"/>
-              </a:ext>
-            </a:extLst>
-          </p:cNvPr>
-          <p:cNvSpPr>
-            <a:spLocks noGrp="1"/>
-          </p:cNvSpPr>
-          <p:nvPr>
-            <p:ph type="title"/>
-          </p:nvPr>
-        </p:nvSpPr>
-        <p:spPr>
-          <a:xfrm>
-            <a:off x="882177" y="244538"/>
-            <a:ext cx="5715000" cy="457200"/>
-          </a:xfrm>
-        </p:spPr>
-        <p:txBody>
-          <a:bodyPr/>
-          <a:lstStyle/>
-          <a:p>
-            <a:r>
-              <a:rPr lang="en-US"/>
-              <a:t>Click to edit Master title style</a:t>
-            </a:r>
-          </a:p>
-        </p:txBody>
-      </p:sp>
-      <p:sp>
-        <p:nvSpPr>
-          <p:cNvPr id="41" name="Content Placeholder 2">
-            <a:extLst>
-              <a:ext uri="{FF2B5EF4-FFF2-40B4-BE49-F238E27FC236}">
-                <a16:creationId xmlns:a16="http://schemas.microsoft.com/office/drawing/2014/main" id="{FB189CA7-9290-5F44-AB07-DAFF5477F988}"/>
-              </a:ext>
-            </a:extLst>
-          </p:cNvPr>
-          <p:cNvSpPr>
-            <a:spLocks noGrp="1"/>
-          </p:cNvSpPr>
-          <p:nvPr>
-            <p:ph idx="13"/>
-          </p:nvPr>
-        </p:nvSpPr>
-        <p:spPr>
-          <a:xfrm>
-            <a:off x="3566160" y="1716597"/>
-            <a:ext cx="3108960" cy="2011680"/>
-          </a:xfrm>
-          <a:ln>
-            <a:solidFill>
-              <a:schemeClr val="bg2">
-                <a:lumMod val="90000"/>
-              </a:schemeClr>
-            </a:solidFill>
-          </a:ln>
-        </p:spPr>
-        <p:txBody>
-          <a:bodyPr>
-            <a:normAutofit/>
-          </a:bodyPr>
-          <a:lstStyle>
-            <a:lvl1pPr>
-              <a:defRPr sz="1050"/>
-            </a:lvl1pPr>
-            <a:lvl2pPr>
-              <a:defRPr sz="1050"/>
-            </a:lvl2pPr>
-            <a:lvl3pPr>
-              <a:defRPr sz="1050"/>
-            </a:lvl3pPr>
-            <a:lvl4pPr>
-              <a:defRPr sz="1050"/>
-            </a:lvl4pPr>
-            <a:lvl5pPr>
-              <a:defRPr sz="1050"/>
-            </a:lvl5pPr>
-          </a:lstStyle>
-          <a:p>
-            <a:pPr lvl="0"/>
-            <a:r>
-              <a:rPr lang="en-US"/>
-              <a:t>Click to edit Master text styles</a:t>
-            </a:r>
-          </a:p>
-          <a:p>
-            <a:pPr lvl="1"/>
-            <a:r>
-              <a:rPr lang="en-US"/>
-              <a:t>Second level</a:t>
-            </a:r>
-          </a:p>
-          <a:p>
-            <a:pPr lvl="2"/>
-            <a:r>
-              <a:rPr lang="en-US"/>
-              <a:t>Third level</a:t>
-            </a:r>
-          </a:p>
-          <a:p>
-            <a:pPr lvl="3"/>
-            <a:r>
-              <a:rPr lang="en-US"/>
-              <a:t>Fourth level</a:t>
-            </a:r>
-          </a:p>
-          <a:p>
-            <a:pPr lvl="4"/>
-            <a:r>
-              <a:rPr lang="en-US"/>
-              <a:t>Fifth level</a:t>
-            </a:r>
-            <a:endParaRPr lang="en-US" dirty="0"/>
-          </a:p>
-        </p:txBody>
-      </p:sp>
-      <p:sp>
-        <p:nvSpPr>
-          <p:cNvPr id="42" name="TextBox 41">
-            <a:extLst>
-              <a:ext uri="{FF2B5EF4-FFF2-40B4-BE49-F238E27FC236}">
-                <a16:creationId xmlns:a16="http://schemas.microsoft.com/office/drawing/2014/main" id="{003EDC32-DFCE-434F-834F-87AD9D4931AD}"/>
-              </a:ext>
-            </a:extLst>
-          </p:cNvPr>
-          <p:cNvSpPr txBox="1"/>
-          <p:nvPr userDrawn="1"/>
-        </p:nvSpPr>
-        <p:spPr>
-          <a:xfrm>
-            <a:off x="3566159" y="1439597"/>
-            <a:ext cx="3108960" cy="276999"/>
-          </a:xfrm>
-          <a:prstGeom prst="rect">
-            <a:avLst/>
-          </a:prstGeom>
-          <a:noFill/>
-        </p:spPr>
-        <p:txBody>
-          <a:bodyPr wrap="none" lIns="0" tIns="0" rIns="0" bIns="0" rtlCol="0">
-            <a:noAutofit/>
-          </a:bodyPr>
-          <a:lstStyle/>
-          <a:p>
-            <a:r>
-              <a:rPr lang="en-US" sz="1800" dirty="0"/>
-              <a:t>Investment Description</a:t>
-            </a:r>
-            <a:endParaRPr lang="en-US" sz="1200" dirty="0"/>
-          </a:p>
-        </p:txBody>
-      </p:sp>
-      <p:sp>
-        <p:nvSpPr>
-          <p:cNvPr id="43" name="Content Placeholder 2">
-            <a:extLst>
-              <a:ext uri="{FF2B5EF4-FFF2-40B4-BE49-F238E27FC236}">
-                <a16:creationId xmlns:a16="http://schemas.microsoft.com/office/drawing/2014/main" id="{287D95BD-5A4D-8748-87D0-27B9C457688A}"/>
-              </a:ext>
-            </a:extLst>
-          </p:cNvPr>
-          <p:cNvSpPr>
-            <a:spLocks noGrp="1"/>
-          </p:cNvSpPr>
-          <p:nvPr>
-            <p:ph idx="14"/>
-          </p:nvPr>
-        </p:nvSpPr>
-        <p:spPr>
-          <a:xfrm>
-            <a:off x="228600" y="4210997"/>
-            <a:ext cx="3108960" cy="2011680"/>
-          </a:xfrm>
-          <a:ln>
-            <a:solidFill>
-              <a:schemeClr val="bg2">
-                <a:lumMod val="90000"/>
-              </a:schemeClr>
-            </a:solidFill>
-          </a:ln>
-        </p:spPr>
-        <p:txBody>
-          <a:bodyPr>
-            <a:normAutofit/>
-          </a:bodyPr>
-          <a:lstStyle>
-            <a:lvl1pPr>
-              <a:defRPr sz="1050"/>
-            </a:lvl1pPr>
-            <a:lvl2pPr>
-              <a:defRPr sz="1050"/>
-            </a:lvl2pPr>
-            <a:lvl3pPr>
-              <a:defRPr sz="1050"/>
-            </a:lvl3pPr>
-            <a:lvl4pPr>
-              <a:defRPr sz="1050"/>
-            </a:lvl4pPr>
-            <a:lvl5pPr>
-              <a:defRPr sz="1050"/>
+            <a:lvl5pPr marL="1371600" indent="0">
+              <a:buNone/>
+              <a:defRPr sz="1000"/>
             </a:lvl5pPr>
           </a:lstStyle>
           <a:p>
@@ -2348,7 +2418,7 @@
         </p:nvSpPr>
         <p:spPr>
           <a:xfrm>
-            <a:off x="228600" y="3930692"/>
+            <a:off x="228600" y="955739"/>
             <a:ext cx="3108960" cy="276998"/>
           </a:xfrm>
           <a:prstGeom prst="rect">
@@ -2388,8 +2458,8 @@
         </p:nvSpPr>
         <p:spPr>
           <a:xfrm>
-            <a:off x="3566160" y="4201204"/>
-            <a:ext cx="3108960" cy="2011680"/>
+            <a:off x="3566160" y="1232737"/>
+            <a:ext cx="3108960" cy="3200400"/>
           </a:xfrm>
           <a:ln>
             <a:solidFill>
@@ -2404,20 +2474,25 @@
             <a:normAutofit/>
           </a:bodyPr>
           <a:lstStyle>
-            <a:lvl1pPr>
-              <a:defRPr sz="1050"/>
+            <a:lvl1pPr marL="0" indent="0">
+              <a:buNone/>
+              <a:defRPr sz="1000"/>
             </a:lvl1pPr>
-            <a:lvl2pPr>
-              <a:defRPr sz="1050"/>
+            <a:lvl2pPr marL="342900" indent="0">
+              <a:buNone/>
+              <a:defRPr sz="1000"/>
             </a:lvl2pPr>
-            <a:lvl3pPr>
-              <a:defRPr sz="1050"/>
+            <a:lvl3pPr marL="685800" indent="0">
+              <a:buNone/>
+              <a:defRPr sz="1000"/>
             </a:lvl3pPr>
-            <a:lvl4pPr>
-              <a:defRPr sz="1050"/>
+            <a:lvl4pPr marL="1028700" indent="0">
+              <a:buNone/>
+              <a:defRPr sz="1000"/>
             </a:lvl4pPr>
-            <a:lvl5pPr>
-              <a:defRPr sz="1050"/>
+            <a:lvl5pPr marL="1371600" indent="0">
+              <a:buNone/>
+              <a:defRPr sz="1000"/>
             </a:lvl5pPr>
           </a:lstStyle>
           <a:p>
@@ -2472,7 +2547,7 @@
         </p:nvSpPr>
         <p:spPr>
           <a:xfrm>
-            <a:off x="3566160" y="3924204"/>
+            <a:off x="3566160" y="959096"/>
             <a:ext cx="3108960" cy="276999"/>
           </a:xfrm>
           <a:prstGeom prst="rect">
@@ -2512,8 +2587,8 @@
         </p:nvSpPr>
         <p:spPr>
           <a:xfrm>
-            <a:off x="228600" y="6645636"/>
-            <a:ext cx="3108960" cy="2011680"/>
+            <a:off x="228600" y="4980204"/>
+            <a:ext cx="3108960" cy="2276207"/>
           </a:xfrm>
           <a:ln>
             <a:solidFill>
@@ -2528,20 +2603,25 @@
             <a:normAutofit/>
           </a:bodyPr>
           <a:lstStyle>
-            <a:lvl1pPr>
-              <a:defRPr sz="1050"/>
+            <a:lvl1pPr marL="0" indent="0">
+              <a:buNone/>
+              <a:defRPr sz="1000"/>
             </a:lvl1pPr>
-            <a:lvl2pPr>
-              <a:defRPr sz="1050"/>
+            <a:lvl2pPr marL="342900" indent="0">
+              <a:buNone/>
+              <a:defRPr sz="1000"/>
             </a:lvl2pPr>
-            <a:lvl3pPr>
-              <a:defRPr sz="1050"/>
+            <a:lvl3pPr marL="685800" indent="0">
+              <a:buNone/>
+              <a:defRPr sz="1000"/>
             </a:lvl3pPr>
-            <a:lvl4pPr>
-              <a:defRPr sz="1050"/>
+            <a:lvl4pPr marL="1028700" indent="0">
+              <a:buNone/>
+              <a:defRPr sz="1000"/>
             </a:lvl4pPr>
-            <a:lvl5pPr>
-              <a:defRPr sz="1050"/>
+            <a:lvl5pPr marL="1371600" indent="0">
+              <a:buNone/>
+              <a:defRPr sz="1000"/>
             </a:lvl5pPr>
           </a:lstStyle>
           <a:p>
@@ -2596,7 +2676,7 @@
         </p:nvSpPr>
         <p:spPr>
           <a:xfrm>
-            <a:off x="228600" y="6365331"/>
+            <a:off x="228600" y="4699899"/>
             <a:ext cx="3108960" cy="276998"/>
           </a:xfrm>
           <a:prstGeom prst="rect">
@@ -2636,8 +2716,8 @@
         </p:nvSpPr>
         <p:spPr>
           <a:xfrm>
-            <a:off x="3566160" y="6635843"/>
-            <a:ext cx="3108960" cy="2011680"/>
+            <a:off x="3566160" y="4970411"/>
+            <a:ext cx="3108960" cy="2286000"/>
           </a:xfrm>
           <a:ln>
             <a:solidFill>
@@ -2652,20 +2732,25 @@
             <a:normAutofit/>
           </a:bodyPr>
           <a:lstStyle>
-            <a:lvl1pPr>
-              <a:defRPr sz="1050"/>
+            <a:lvl1pPr marL="0" indent="0">
+              <a:buNone/>
+              <a:defRPr sz="1000"/>
             </a:lvl1pPr>
-            <a:lvl2pPr>
-              <a:defRPr sz="1050"/>
+            <a:lvl2pPr marL="342900" indent="0">
+              <a:buNone/>
+              <a:defRPr sz="1000"/>
             </a:lvl2pPr>
-            <a:lvl3pPr>
-              <a:defRPr sz="1050"/>
+            <a:lvl3pPr marL="685800" indent="0">
+              <a:buNone/>
+              <a:defRPr sz="1000"/>
             </a:lvl3pPr>
-            <a:lvl4pPr>
-              <a:defRPr sz="1050"/>
+            <a:lvl4pPr marL="1028700" indent="0">
+              <a:buNone/>
+              <a:defRPr sz="1000"/>
             </a:lvl4pPr>
-            <a:lvl5pPr>
-              <a:defRPr sz="1050"/>
+            <a:lvl5pPr marL="1371600" indent="0">
+              <a:buNone/>
+              <a:defRPr sz="1000"/>
             </a:lvl5pPr>
           </a:lstStyle>
           <a:p>
@@ -2720,7 +2805,7 @@
         </p:nvSpPr>
         <p:spPr>
           <a:xfrm>
-            <a:off x="3566160" y="6358843"/>
+            <a:off x="3566160" y="4693411"/>
             <a:ext cx="3108960" cy="276999"/>
           </a:xfrm>
           <a:prstGeom prst="rect">
@@ -2739,6 +2824,135 @@
               <a:t>Systems</a:t>
             </a:r>
             <a:endParaRPr lang="en-US" sz="1200" dirty="0"/>
+          </a:p>
+        </p:txBody>
+      </p:sp>
+      <p:sp>
+        <p:nvSpPr>
+          <p:cNvPr id="18" name="TextBox 17">
+            <a:extLst>
+              <a:ext uri="{FF2B5EF4-FFF2-40B4-BE49-F238E27FC236}">
+                <a16:creationId xmlns:a16="http://schemas.microsoft.com/office/drawing/2014/main" id="{24F30853-CBFC-6147-AB80-283988A04666}"/>
+              </a:ext>
+            </a:extLst>
+          </p:cNvPr>
+          <p:cNvSpPr txBox="1"/>
+          <p:nvPr userDrawn="1"/>
+        </p:nvSpPr>
+        <p:spPr>
+          <a:xfrm>
+            <a:off x="228600" y="7445597"/>
+            <a:ext cx="3108960" cy="276998"/>
+          </a:xfrm>
+          <a:prstGeom prst="rect">
+            <a:avLst/>
+          </a:prstGeom>
+          <a:noFill/>
+        </p:spPr>
+        <p:txBody>
+          <a:bodyPr wrap="square" lIns="0" tIns="0" rIns="0" bIns="0" rtlCol="0">
+            <a:noAutofit/>
+          </a:bodyPr>
+          <a:lstStyle/>
+          <a:p>
+            <a:r>
+              <a:rPr lang="en-US" sz="1800" dirty="0"/>
+              <a:t>Additional Information</a:t>
+            </a:r>
+            <a:endParaRPr lang="en-US" sz="1200" dirty="0"/>
+          </a:p>
+        </p:txBody>
+      </p:sp>
+      <p:sp>
+        <p:nvSpPr>
+          <p:cNvPr id="19" name="Content Placeholder 2">
+            <a:extLst>
+              <a:ext uri="{FF2B5EF4-FFF2-40B4-BE49-F238E27FC236}">
+                <a16:creationId xmlns:a16="http://schemas.microsoft.com/office/drawing/2014/main" id="{6E03AC72-3C8C-3D4F-894B-44EBA1CFFC6C}"/>
+              </a:ext>
+            </a:extLst>
+          </p:cNvPr>
+          <p:cNvSpPr>
+            <a:spLocks noGrp="1"/>
+          </p:cNvSpPr>
+          <p:nvPr>
+            <p:ph idx="18"/>
+          </p:nvPr>
+        </p:nvSpPr>
+        <p:spPr>
+          <a:xfrm>
+            <a:off x="228600" y="7722595"/>
+            <a:ext cx="6446520" cy="1205683"/>
+          </a:xfrm>
+          <a:ln>
+            <a:solidFill>
+              <a:schemeClr val="bg2">
+                <a:lumMod val="90000"/>
+              </a:schemeClr>
+            </a:solidFill>
+          </a:ln>
+        </p:spPr>
+        <p:txBody>
+          <a:bodyPr>
+            <a:normAutofit/>
+          </a:bodyPr>
+          <a:lstStyle>
+            <a:lvl1pPr marL="0" indent="0">
+              <a:buNone/>
+              <a:defRPr sz="1000"/>
+            </a:lvl1pPr>
+            <a:lvl2pPr marL="342900" indent="0">
+              <a:buNone/>
+              <a:defRPr sz="1000"/>
+            </a:lvl2pPr>
+            <a:lvl3pPr marL="685800" indent="0">
+              <a:buNone/>
+              <a:defRPr sz="1000"/>
+            </a:lvl3pPr>
+            <a:lvl4pPr marL="1028700" indent="0">
+              <a:buNone/>
+              <a:defRPr sz="1000"/>
+            </a:lvl4pPr>
+            <a:lvl5pPr marL="1371600" indent="0">
+              <a:buNone/>
+              <a:defRPr sz="1000"/>
+            </a:lvl5pPr>
+          </a:lstStyle>
+          <a:p>
+            <a:pPr lvl="0"/>
+            <a:r>
+              <a:rPr lang="en-US"/>
+              <a:t>Click to edit Master text styles</a:t>
+            </a:r>
+          </a:p>
+          <a:p>
+            <a:pPr lvl="1"/>
+            <a:r>
+              <a:rPr lang="en-US"/>
+              <a:t>Second level</a:t>
+            </a:r>
+          </a:p>
+          <a:p>
+            <a:pPr lvl="2"/>
+            <a:r>
+              <a:rPr lang="en-US"/>
+              <a:t>Third level</a:t>
+            </a:r>
+          </a:p>
+          <a:p>
+            <a:pPr lvl="3"/>
+            <a:r>
+              <a:rPr lang="en-US"/>
+              <a:t>Fourth level</a:t>
+            </a:r>
+          </a:p>
+          <a:p>
+            <a:pPr lvl="4"/>
+            <a:r>
+              <a:rPr lang="en-US"/>
+              <a:t>Fifth level</a:t>
+            </a:r>
+            <a:endParaRPr lang="en-US" dirty="0"/>
           </a:p>
         </p:txBody>
       </p:sp>
@@ -2926,7 +3140,7 @@
           <a:p>
             <a:fld id="{0DAB70E3-47D6-2842-9376-028C836601F0}" type="datetimeFigureOut">
               <a:rPr lang="en-US" smtClean="0"/>
-              <a:t>8/26/19</a:t>
+              <a:t>8/28/19</a:t>
             </a:fld>
             <a:endParaRPr lang="en-US"/>
           </a:p>
@@ -3298,7 +3512,7 @@
           <a:p>
             <a:fld id="{0DAB70E3-47D6-2842-9376-028C836601F0}" type="datetimeFigureOut">
               <a:rPr lang="en-US" smtClean="0"/>
-              <a:t>8/26/19</a:t>
+              <a:t>8/28/19</a:t>
             </a:fld>
             <a:endParaRPr lang="en-US"/>
           </a:p>
@@ -3416,7 +3630,7 @@
           <a:p>
             <a:fld id="{0DAB70E3-47D6-2842-9376-028C836601F0}" type="datetimeFigureOut">
               <a:rPr lang="en-US" smtClean="0"/>
-              <a:t>8/26/19</a:t>
+              <a:t>8/28/19</a:t>
             </a:fld>
             <a:endParaRPr lang="en-US"/>
           </a:p>
@@ -3626,7 +3840,7 @@
           <a:p>
             <a:fld id="{0DAB70E3-47D6-2842-9376-028C836601F0}" type="datetimeFigureOut">
               <a:rPr lang="en-US" smtClean="0"/>
-              <a:t>8/26/19</a:t>
+              <a:t>8/28/19</a:t>
             </a:fld>
             <a:endParaRPr lang="en-US"/>
           </a:p>
@@ -3839,7 +4053,7 @@
           <a:p>
             <a:fld id="{0DAB70E3-47D6-2842-9376-028C836601F0}" type="datetimeFigureOut">
               <a:rPr lang="en-US" smtClean="0"/>
-              <a:t>8/26/19</a:t>
+              <a:t>8/28/19</a:t>
             </a:fld>
             <a:endParaRPr lang="en-US"/>
           </a:p>
@@ -4256,7 +4470,7 @@
 </file>
 
 <file path=ppt/slides/slide1.xml><?xml version="1.0" encoding="utf-8"?>
-<p:sld xmlns:a="http://schemas.openxmlformats.org/drawingml/2006/main" xmlns:p="http://schemas.openxmlformats.org/presentationml/2006/main" xmlns:r="http://schemas.openxmlformats.org/officeDocument/2006/relationships">
+<p:sld xmlns:a="http://schemas.openxmlformats.org/drawingml/2006/main" xmlns:r="http://schemas.openxmlformats.org/officeDocument/2006/relationships" xmlns:p="http://schemas.openxmlformats.org/presentationml/2006/main">
   <p:cSld>
     <p:spTree>
       <p:nvGrpSpPr>
@@ -4264,7 +4478,14 @@
         <p:cNvGrpSpPr/>
         <p:nvPr/>
       </p:nvGrpSpPr>
-      <p:grpSpPr/>
+      <p:grpSpPr>
+        <a:xfrm>
+          <a:off x="0" y="0"/>
+          <a:ext cx="0" cy="0"/>
+          <a:chOff x="0" y="0"/>
+          <a:chExt cx="0" cy="0"/>
+        </a:xfrm>
+      </p:grpSpPr>
       <p:sp>
         <p:nvSpPr>
           <p:cNvPr id="2" name="Title 1"/>
@@ -4316,7 +4537,7 @@
 </file>
 
 <file path=ppt/slides/slide2.xml><?xml version="1.0" encoding="utf-8"?>
-<p:sld xmlns:a="http://schemas.openxmlformats.org/drawingml/2006/main" xmlns:p="http://schemas.openxmlformats.org/presentationml/2006/main" xmlns:r="http://schemas.openxmlformats.org/officeDocument/2006/relationships">
+<p:sld xmlns:a="http://schemas.openxmlformats.org/drawingml/2006/main" xmlns:r="http://schemas.openxmlformats.org/officeDocument/2006/relationships" xmlns:p="http://schemas.openxmlformats.org/presentationml/2006/main">
   <p:cSld>
     <p:spTree>
       <p:nvGrpSpPr>
@@ -4324,7 +4545,14 @@
         <p:cNvGrpSpPr/>
         <p:nvPr/>
       </p:nvGrpSpPr>
-      <p:grpSpPr/>
+      <p:grpSpPr>
+        <a:xfrm>
+          <a:off x="0" y="0"/>
+          <a:ext cx="0" cy="0"/>
+          <a:chOff x="0" y="0"/>
+          <a:chExt cx="0" cy="0"/>
+        </a:xfrm>
+      </p:grpSpPr>
       <p:sp>
         <p:nvSpPr>
           <p:cNvPr id="2" name="Title 1"/>
@@ -4376,7 +4604,7 @@
 </file>
 
 <file path=ppt/slides/slide3.xml><?xml version="1.0" encoding="utf-8"?>
-<p:sld xmlns:a="http://schemas.openxmlformats.org/drawingml/2006/main" xmlns:p="http://schemas.openxmlformats.org/presentationml/2006/main" xmlns:r="http://schemas.openxmlformats.org/officeDocument/2006/relationships">
+<p:sld xmlns:a="http://schemas.openxmlformats.org/drawingml/2006/main" xmlns:r="http://schemas.openxmlformats.org/officeDocument/2006/relationships" xmlns:p="http://schemas.openxmlformats.org/presentationml/2006/main">
   <p:cSld>
     <p:spTree>
       <p:nvGrpSpPr>
@@ -4384,7 +4612,14 @@
         <p:cNvGrpSpPr/>
         <p:nvPr/>
       </p:nvGrpSpPr>
-      <p:grpSpPr/>
+      <p:grpSpPr>
+        <a:xfrm>
+          <a:off x="0" y="0"/>
+          <a:ext cx="0" cy="0"/>
+          <a:chOff x="0" y="0"/>
+          <a:chExt cx="0" cy="0"/>
+        </a:xfrm>
+      </p:grpSpPr>
       <p:sp>
         <p:nvSpPr>
           <p:cNvPr id="2" name="Content Placeholder 1"/>
@@ -4413,7 +4648,7 @@
             <a:spLocks noGrp="1"/>
           </p:cNvSpPr>
           <p:nvPr>
-            <p:ph type="body" idx="15" sz="quarter"/>
+            <p:ph type="body" sz="quarter" idx="15"/>
           </p:nvPr>
         </p:nvSpPr>
         <p:spPr/>
@@ -4434,7 +4669,7 @@
             <a:spLocks noGrp="1"/>
           </p:cNvSpPr>
           <p:nvPr>
-            <p:ph type="body" idx="16" sz="quarter"/>
+            <p:ph type="body" sz="quarter" idx="16"/>
           </p:nvPr>
         </p:nvSpPr>
         <p:spPr/>
@@ -4455,7 +4690,7 @@
             <a:spLocks noGrp="1"/>
           </p:cNvSpPr>
           <p:nvPr>
-            <p:ph type="body" idx="17" sz="quarter"/>
+            <p:ph type="body" sz="quarter" idx="17"/>
           </p:nvPr>
         </p:nvSpPr>
         <p:spPr/>
@@ -4476,7 +4711,7 @@
             <a:spLocks noGrp="1"/>
           </p:cNvSpPr>
           <p:nvPr>
-            <p:ph type="body" idx="18" sz="quarter"/>
+            <p:ph type="body" sz="quarter" idx="18"/>
           </p:nvPr>
         </p:nvSpPr>
         <p:spPr/>
@@ -4497,7 +4732,7 @@
             <a:spLocks noGrp="1"/>
           </p:cNvSpPr>
           <p:nvPr>
-            <p:ph type="body" idx="19" sz="quarter"/>
+            <p:ph type="body" sz="quarter" idx="19"/>
           </p:nvPr>
         </p:nvSpPr>
         <p:spPr/>
@@ -4518,7 +4753,7 @@
             <a:spLocks noGrp="1"/>
           </p:cNvSpPr>
           <p:nvPr>
-            <p:ph type="body" idx="20" sz="quarter"/>
+            <p:ph type="body" sz="quarter" idx="20"/>
           </p:nvPr>
         </p:nvSpPr>
         <p:spPr/>
@@ -4539,7 +4774,7 @@
             <a:spLocks noGrp="1"/>
           </p:cNvSpPr>
           <p:nvPr>
-            <p:ph type="body" idx="21" sz="quarter"/>
+            <p:ph type="body" sz="quarter" idx="21"/>
           </p:nvPr>
         </p:nvSpPr>
         <p:spPr/>
@@ -4560,7 +4795,7 @@
             <a:spLocks noGrp="1"/>
           </p:cNvSpPr>
           <p:nvPr>
-            <p:ph type="body" idx="22" sz="quarter"/>
+            <p:ph type="body" sz="quarter" idx="22"/>
           </p:nvPr>
         </p:nvSpPr>
         <p:spPr/>
@@ -4602,7 +4837,7 @@
             <a:spLocks noGrp="1"/>
           </p:cNvSpPr>
           <p:nvPr>
-            <p:ph type="body" idx="23" sz="quarter"/>
+            <p:ph type="body" sz="quarter" idx="23"/>
           </p:nvPr>
         </p:nvSpPr>
         <p:spPr/>
@@ -4623,7 +4858,7 @@
             <a:spLocks noGrp="1"/>
           </p:cNvSpPr>
           <p:nvPr>
-            <p:ph type="body" idx="24" sz="quarter"/>
+            <p:ph type="body" sz="quarter" idx="24"/>
           </p:nvPr>
         </p:nvSpPr>
         <p:spPr/>
@@ -4644,7 +4879,7 @@
             <a:spLocks noGrp="1"/>
           </p:cNvSpPr>
           <p:nvPr>
-            <p:ph type="body" idx="25" sz="quarter"/>
+            <p:ph type="body" sz="quarter" idx="25"/>
           </p:nvPr>
         </p:nvSpPr>
         <p:spPr/>
@@ -4665,7 +4900,7 @@
             <a:spLocks noGrp="1"/>
           </p:cNvSpPr>
           <p:nvPr>
-            <p:ph type="body" idx="27" sz="quarter"/>
+            <p:ph type="body" sz="quarter" idx="27"/>
           </p:nvPr>
         </p:nvSpPr>
         <p:spPr/>
@@ -4675,6 +4910,48 @@
           <a:p>
             <a:r>
               <a:t>Placeholder index:27 type:Text Placeholder 14</a:t>
+            </a:r>
+          </a:p>
+        </p:txBody>
+      </p:sp>
+      <p:sp>
+        <p:nvSpPr>
+          <p:cNvPr id="16" name="Content Placeholder 15"/>
+          <p:cNvSpPr>
+            <a:spLocks noGrp="1"/>
+          </p:cNvSpPr>
+          <p:nvPr>
+            <p:ph idx="28"/>
+          </p:nvPr>
+        </p:nvSpPr>
+        <p:spPr/>
+        <p:txBody>
+          <a:bodyPr/>
+          <a:lstStyle/>
+          <a:p>
+            <a:r>
+              <a:t>Placeholder index:28 type:Content Placeholder 15</a:t>
+            </a:r>
+          </a:p>
+        </p:txBody>
+      </p:sp>
+      <p:sp>
+        <p:nvSpPr>
+          <p:cNvPr id="17" name="Content Placeholder 16"/>
+          <p:cNvSpPr>
+            <a:spLocks noGrp="1"/>
+          </p:cNvSpPr>
+          <p:nvPr>
+            <p:ph idx="13"/>
+          </p:nvPr>
+        </p:nvSpPr>
+        <p:spPr/>
+        <p:txBody>
+          <a:bodyPr/>
+          <a:lstStyle/>
+          <a:p>
+            <a:r>
+              <a:t>Placeholder index:13 type:Content Placeholder 16</a:t>
             </a:r>
           </a:p>
         </p:txBody>
@@ -4688,7 +4965,7 @@
 </file>
 
 <file path=ppt/slides/slide4.xml><?xml version="1.0" encoding="utf-8"?>
-<p:sld xmlns:a="http://schemas.openxmlformats.org/drawingml/2006/main" xmlns:p="http://schemas.openxmlformats.org/presentationml/2006/main" xmlns:r="http://schemas.openxmlformats.org/officeDocument/2006/relationships">
+<p:sld xmlns:a="http://schemas.openxmlformats.org/drawingml/2006/main" xmlns:r="http://schemas.openxmlformats.org/officeDocument/2006/relationships" xmlns:p="http://schemas.openxmlformats.org/presentationml/2006/main">
   <p:cSld>
     <p:spTree>
       <p:nvGrpSpPr>
@@ -4696,31 +4973,17 @@
         <p:cNvGrpSpPr/>
         <p:nvPr/>
       </p:nvGrpSpPr>
-      <p:grpSpPr/>
-      <p:sp>
-        <p:nvSpPr>
-          <p:cNvPr id="2" name="Content Placeholder 1"/>
-          <p:cNvSpPr>
-            <a:spLocks noGrp="1"/>
-          </p:cNvSpPr>
-          <p:nvPr>
-            <p:ph idx="1"/>
-          </p:nvPr>
-        </p:nvSpPr>
-        <p:spPr/>
-        <p:txBody>
-          <a:bodyPr/>
-          <a:lstStyle/>
-          <a:p>
-            <a:r>
-              <a:t>Placeholder index:1 type:Content Placeholder 1</a:t>
-            </a:r>
-          </a:p>
-        </p:txBody>
-      </p:sp>
-      <p:sp>
-        <p:nvSpPr>
-          <p:cNvPr id="3" name="Title 2"/>
+      <p:grpSpPr>
+        <a:xfrm>
+          <a:off x="0" y="0"/>
+          <a:ext cx="0" cy="0"/>
+          <a:chOff x="0" y="0"/>
+          <a:chExt cx="0" cy="0"/>
+        </a:xfrm>
+      </p:grpSpPr>
+      <p:sp>
+        <p:nvSpPr>
+          <p:cNvPr id="2" name="Title 1"/>
           <p:cNvSpPr>
             <a:spLocks noGrp="1"/>
           </p:cNvSpPr>
@@ -4741,21 +5004,42 @@
       </p:sp>
       <p:sp>
         <p:nvSpPr>
+          <p:cNvPr id="3" name="Content Placeholder 2"/>
+          <p:cNvSpPr>
+            <a:spLocks noGrp="1"/>
+          </p:cNvSpPr>
+          <p:nvPr>
+            <p:ph idx="14"/>
+          </p:nvPr>
+        </p:nvSpPr>
+        <p:spPr/>
+        <p:txBody>
+          <a:bodyPr/>
+          <a:lstStyle/>
+          <a:p>
+            <a:r>
+              <a:t>Placeholder index:14 type:Content Placeholder 2</a:t>
+            </a:r>
+          </a:p>
+        </p:txBody>
+      </p:sp>
+      <p:sp>
+        <p:nvSpPr>
           <p:cNvPr id="4" name="Content Placeholder 3"/>
           <p:cNvSpPr>
             <a:spLocks noGrp="1"/>
           </p:cNvSpPr>
           <p:nvPr>
-            <p:ph idx="13"/>
-          </p:nvPr>
-        </p:nvSpPr>
-        <p:spPr/>
-        <p:txBody>
-          <a:bodyPr/>
-          <a:lstStyle/>
-          <a:p>
-            <a:r>
-              <a:t>Placeholder index:13 type:Content Placeholder 3</a:t>
+            <p:ph idx="15"/>
+          </p:nvPr>
+        </p:nvSpPr>
+        <p:spPr/>
+        <p:txBody>
+          <a:bodyPr/>
+          <a:lstStyle/>
+          <a:p>
+            <a:r>
+              <a:t>Placeholder index:15 type:Content Placeholder 3</a:t>
             </a:r>
           </a:p>
         </p:txBody>
@@ -4767,16 +5051,16 @@
             <a:spLocks noGrp="1"/>
           </p:cNvSpPr>
           <p:nvPr>
-            <p:ph idx="14"/>
-          </p:nvPr>
-        </p:nvSpPr>
-        <p:spPr/>
-        <p:txBody>
-          <a:bodyPr/>
-          <a:lstStyle/>
-          <a:p>
-            <a:r>
-              <a:t>Placeholder index:14 type:Content Placeholder 4</a:t>
+            <p:ph idx="16"/>
+          </p:nvPr>
+        </p:nvSpPr>
+        <p:spPr/>
+        <p:txBody>
+          <a:bodyPr/>
+          <a:lstStyle/>
+          <a:p>
+            <a:r>
+              <a:t>Placeholder index:16 type:Content Placeholder 4</a:t>
             </a:r>
           </a:p>
         </p:txBody>
@@ -4788,16 +5072,16 @@
             <a:spLocks noGrp="1"/>
           </p:cNvSpPr>
           <p:nvPr>
-            <p:ph idx="15"/>
-          </p:nvPr>
-        </p:nvSpPr>
-        <p:spPr/>
-        <p:txBody>
-          <a:bodyPr/>
-          <a:lstStyle/>
-          <a:p>
-            <a:r>
-              <a:t>Placeholder index:15 type:Content Placeholder 5</a:t>
+            <p:ph idx="17"/>
+          </p:nvPr>
+        </p:nvSpPr>
+        <p:spPr/>
+        <p:txBody>
+          <a:bodyPr/>
+          <a:lstStyle/>
+          <a:p>
+            <a:r>
+              <a:t>Placeholder index:17 type:Content Placeholder 5</a:t>
             </a:r>
           </a:p>
         </p:txBody>
@@ -4809,37 +5093,16 @@
             <a:spLocks noGrp="1"/>
           </p:cNvSpPr>
           <p:nvPr>
-            <p:ph idx="16"/>
-          </p:nvPr>
-        </p:nvSpPr>
-        <p:spPr/>
-        <p:txBody>
-          <a:bodyPr/>
-          <a:lstStyle/>
-          <a:p>
-            <a:r>
-              <a:t>Placeholder index:16 type:Content Placeholder 6</a:t>
-            </a:r>
-          </a:p>
-        </p:txBody>
-      </p:sp>
-      <p:sp>
-        <p:nvSpPr>
-          <p:cNvPr id="8" name="Content Placeholder 7"/>
-          <p:cNvSpPr>
-            <a:spLocks noGrp="1"/>
-          </p:cNvSpPr>
-          <p:nvPr>
-            <p:ph idx="17"/>
-          </p:nvPr>
-        </p:nvSpPr>
-        <p:spPr/>
-        <p:txBody>
-          <a:bodyPr/>
-          <a:lstStyle/>
-          <a:p>
-            <a:r>
-              <a:t>Placeholder index:17 type:Content Placeholder 7</a:t>
+            <p:ph idx="18"/>
+          </p:nvPr>
+        </p:nvSpPr>
+        <p:spPr/>
+        <p:txBody>
+          <a:bodyPr/>
+          <a:lstStyle/>
+          <a:p>
+            <a:r>
+              <a:t>Placeholder index:18 type:Content Placeholder 6</a:t>
             </a:r>
           </a:p>
         </p:txBody>
@@ -4853,7 +5116,7 @@
 </file>
 
 <file path=ppt/slides/slide5.xml><?xml version="1.0" encoding="utf-8"?>
-<p:sld xmlns:a="http://schemas.openxmlformats.org/drawingml/2006/main" xmlns:p="http://schemas.openxmlformats.org/presentationml/2006/main" xmlns:r="http://schemas.openxmlformats.org/officeDocument/2006/relationships">
+<p:sld xmlns:a="http://schemas.openxmlformats.org/drawingml/2006/main" xmlns:r="http://schemas.openxmlformats.org/officeDocument/2006/relationships" xmlns:p="http://schemas.openxmlformats.org/presentationml/2006/main">
   <p:cSld>
     <p:spTree>
       <p:nvGrpSpPr>
@@ -4861,7 +5124,14 @@
         <p:cNvGrpSpPr/>
         <p:nvPr/>
       </p:nvGrpSpPr>
-      <p:grpSpPr/>
+      <p:grpSpPr>
+        <a:xfrm>
+          <a:off x="0" y="0"/>
+          <a:ext cx="0" cy="0"/>
+          <a:chOff x="0" y="0"/>
+          <a:chExt cx="0" cy="0"/>
+        </a:xfrm>
+      </p:grpSpPr>
       <p:sp>
         <p:nvSpPr>
           <p:cNvPr id="2" name="Title 1"/>
@@ -4890,7 +5160,7 @@
             <a:spLocks noGrp="1"/>
           </p:cNvSpPr>
           <p:nvPr>
-            <p:ph idx="1" sz="half"/>
+            <p:ph sz="half" idx="1"/>
           </p:nvPr>
         </p:nvSpPr>
         <p:spPr/>
@@ -4911,7 +5181,7 @@
             <a:spLocks noGrp="1"/>
           </p:cNvSpPr>
           <p:nvPr>
-            <p:ph idx="2" sz="half"/>
+            <p:ph sz="half" idx="2"/>
           </p:nvPr>
         </p:nvSpPr>
         <p:spPr/>
@@ -4934,7 +5204,7 @@
 </file>
 
 <file path=ppt/slides/slide6.xml><?xml version="1.0" encoding="utf-8"?>
-<p:sld xmlns:a="http://schemas.openxmlformats.org/drawingml/2006/main" xmlns:p="http://schemas.openxmlformats.org/presentationml/2006/main" xmlns:r="http://schemas.openxmlformats.org/officeDocument/2006/relationships">
+<p:sld xmlns:a="http://schemas.openxmlformats.org/drawingml/2006/main" xmlns:r="http://schemas.openxmlformats.org/officeDocument/2006/relationships" xmlns:p="http://schemas.openxmlformats.org/presentationml/2006/main">
   <p:cSld>
     <p:spTree>
       <p:nvGrpSpPr>
@@ -4942,7 +5212,14 @@
         <p:cNvGrpSpPr/>
         <p:nvPr/>
       </p:nvGrpSpPr>
-      <p:grpSpPr/>
+      <p:grpSpPr>
+        <a:xfrm>
+          <a:off x="0" y="0"/>
+          <a:ext cx="0" cy="0"/>
+          <a:chOff x="0" y="0"/>
+          <a:chExt cx="0" cy="0"/>
+        </a:xfrm>
+      </p:grpSpPr>
       <p:sp>
         <p:nvSpPr>
           <p:cNvPr id="2" name="Title 1"/>
@@ -4992,7 +5269,7 @@
             <a:spLocks noGrp="1"/>
           </p:cNvSpPr>
           <p:nvPr>
-            <p:ph idx="2" sz="half"/>
+            <p:ph sz="half" idx="2"/>
           </p:nvPr>
         </p:nvSpPr>
         <p:spPr/>
@@ -5013,7 +5290,7 @@
             <a:spLocks noGrp="1"/>
           </p:cNvSpPr>
           <p:nvPr>
-            <p:ph type="body" idx="3" sz="quarter"/>
+            <p:ph type="body" sz="quarter" idx="3"/>
           </p:nvPr>
         </p:nvSpPr>
         <p:spPr/>
@@ -5034,7 +5311,7 @@
             <a:spLocks noGrp="1"/>
           </p:cNvSpPr>
           <p:nvPr>
-            <p:ph idx="4" sz="quarter"/>
+            <p:ph sz="quarter" idx="4"/>
           </p:nvPr>
         </p:nvSpPr>
         <p:spPr/>
@@ -5057,7 +5334,7 @@
 </file>
 
 <file path=ppt/slides/slide7.xml><?xml version="1.0" encoding="utf-8"?>
-<p:sld xmlns:a="http://schemas.openxmlformats.org/drawingml/2006/main" xmlns:p="http://schemas.openxmlformats.org/presentationml/2006/main" xmlns:r="http://schemas.openxmlformats.org/officeDocument/2006/relationships">
+<p:sld xmlns:a="http://schemas.openxmlformats.org/drawingml/2006/main" xmlns:r="http://schemas.openxmlformats.org/officeDocument/2006/relationships" xmlns:p="http://schemas.openxmlformats.org/presentationml/2006/main">
   <p:cSld>
     <p:spTree>
       <p:nvGrpSpPr>
@@ -5065,7 +5342,14 @@
         <p:cNvGrpSpPr/>
         <p:nvPr/>
       </p:nvGrpSpPr>
-      <p:grpSpPr/>
+      <p:grpSpPr>
+        <a:xfrm>
+          <a:off x="0" y="0"/>
+          <a:ext cx="0" cy="0"/>
+          <a:chOff x="0" y="0"/>
+          <a:chExt cx="0" cy="0"/>
+        </a:xfrm>
+      </p:grpSpPr>
       <p:sp>
         <p:nvSpPr>
           <p:cNvPr id="2" name="Title 1"/>
@@ -5096,7 +5380,7 @@
 </file>
 
 <file path=ppt/slides/slide8.xml><?xml version="1.0" encoding="utf-8"?>
-<p:sld xmlns:a="http://schemas.openxmlformats.org/drawingml/2006/main" xmlns:p="http://schemas.openxmlformats.org/presentationml/2006/main" xmlns:r="http://schemas.openxmlformats.org/officeDocument/2006/relationships">
+<p:sld xmlns:a="http://schemas.openxmlformats.org/drawingml/2006/main" xmlns:r="http://schemas.openxmlformats.org/officeDocument/2006/relationships" xmlns:p="http://schemas.openxmlformats.org/presentationml/2006/main">
   <p:cSld>
     <p:spTree>
       <p:nvGrpSpPr>
@@ -5104,7 +5388,14 @@
         <p:cNvGrpSpPr/>
         <p:nvPr/>
       </p:nvGrpSpPr>
-      <p:grpSpPr/>
+      <p:grpSpPr>
+        <a:xfrm>
+          <a:off x="0" y="0"/>
+          <a:ext cx="0" cy="0"/>
+          <a:chOff x="0" y="0"/>
+          <a:chExt cx="0" cy="0"/>
+        </a:xfrm>
+      </p:grpSpPr>
     </p:spTree>
   </p:cSld>
   <p:clrMapOvr>
@@ -5114,7 +5405,7 @@
 </file>
 
 <file path=ppt/slides/slide9.xml><?xml version="1.0" encoding="utf-8"?>
-<p:sld xmlns:a="http://schemas.openxmlformats.org/drawingml/2006/main" xmlns:p="http://schemas.openxmlformats.org/presentationml/2006/main" xmlns:r="http://schemas.openxmlformats.org/officeDocument/2006/relationships">
+<p:sld xmlns:a="http://schemas.openxmlformats.org/drawingml/2006/main" xmlns:r="http://schemas.openxmlformats.org/officeDocument/2006/relationships" xmlns:p="http://schemas.openxmlformats.org/presentationml/2006/main">
   <p:cSld>
     <p:spTree>
       <p:nvGrpSpPr>
@@ -5122,7 +5413,14 @@
         <p:cNvGrpSpPr/>
         <p:nvPr/>
       </p:nvGrpSpPr>
-      <p:grpSpPr/>
+      <p:grpSpPr>
+        <a:xfrm>
+          <a:off x="0" y="0"/>
+          <a:ext cx="0" cy="0"/>
+          <a:chOff x="0" y="0"/>
+          <a:chExt cx="0" cy="0"/>
+        </a:xfrm>
+      </p:grpSpPr>
       <p:sp>
         <p:nvSpPr>
           <p:cNvPr id="2" name="Vertical Content Placeholder 1"/>
@@ -5130,7 +5428,7 @@
             <a:spLocks noGrp="1"/>
           </p:cNvSpPr>
           <p:nvPr>
-            <p:ph idx="13" orient="vert" sz="quarter"/>
+            <p:ph orient="vert" sz="quarter" idx="13"/>
           </p:nvPr>
         </p:nvSpPr>
         <p:spPr/>

</xml_diff>